<commit_message>
Fixes for BioNLP 2019 slides
</commit_message>
<xml_diff>
--- a/presentations/2019-BioNLP.pptx
+++ b/presentations/2019-BioNLP.pptx
@@ -6391,76 +6391,6 @@
           </a:p>
         </p:txBody>
       </p:sp>
-      <p:pic>
-        <p:nvPicPr>
-          <p:cNvPr id="8" name="Picture 2" descr="T:\BBE\Virtual Functional Anatomy\Poster&amp; talks\ISB 2013\Hum Shape\NIH_CC_External_Master_Logo_2Color.jpg">
-            <a:extLst>
-              <a:ext uri="{FF2B5EF4-FFF2-40B4-BE49-F238E27FC236}">
-                <a16:creationId xmlns:a16="http://schemas.microsoft.com/office/drawing/2014/main" id="{F2A9791B-7CCC-8A44-A596-A1D63850C741}"/>
-              </a:ext>
-            </a:extLst>
-          </p:cNvPr>
-          <p:cNvPicPr>
-            <a:picLocks noChangeAspect="1" noChangeArrowheads="1"/>
-          </p:cNvPicPr>
-          <p:nvPr/>
-        </p:nvPicPr>
-        <p:blipFill>
-          <a:blip r:embed="rId2">
-            <a:clrChange>
-              <a:clrFrom>
-                <a:srgbClr val="FFFFFF"/>
-              </a:clrFrom>
-              <a:clrTo>
-                <a:srgbClr val="FFFFFF">
-                  <a:alpha val="0"/>
-                </a:srgbClr>
-              </a:clrTo>
-            </a:clrChange>
-            <a:extLst>
-              <a:ext uri="{28A0092B-C50C-407E-A947-70E740481C1C}">
-                <a14:useLocalDpi xmlns:a14="http://schemas.microsoft.com/office/drawing/2010/main" val="0"/>
-              </a:ext>
-            </a:extLst>
-          </a:blip>
-          <a:srcRect/>
-          <a:stretch>
-            <a:fillRect/>
-          </a:stretch>
-        </p:blipFill>
-        <p:spPr bwMode="auto">
-          <a:xfrm>
-            <a:off x="9693846" y="238073"/>
-            <a:ext cx="2345754" cy="449367"/>
-          </a:xfrm>
-          <a:prstGeom prst="rect">
-            <a:avLst/>
-          </a:prstGeom>
-          <a:noFill/>
-          <a:ln>
-            <a:noFill/>
-          </a:ln>
-          <a:extLst>
-            <a:ext uri="{909E8E84-426E-40DD-AFC4-6F175D3DCCD1}">
-              <a14:hiddenFill xmlns:a14="http://schemas.microsoft.com/office/drawing/2010/main">
-                <a:solidFill>
-                  <a:srgbClr val="FFFFFF"/>
-                </a:solidFill>
-              </a14:hiddenFill>
-            </a:ext>
-            <a:ext uri="{91240B29-F687-4F45-9708-019B960494DF}">
-              <a14:hiddenLine xmlns:a14="http://schemas.microsoft.com/office/drawing/2010/main" w="9525">
-                <a:solidFill>
-                  <a:srgbClr val="000000"/>
-                </a:solidFill>
-                <a:miter lim="800000"/>
-                <a:headEnd/>
-                <a:tailEnd/>
-              </a14:hiddenLine>
-            </a:ext>
-          </a:extLst>
-        </p:spPr>
-      </p:pic>
       <p:sp>
         <p:nvSpPr>
           <p:cNvPr id="9" name="Rounded Rectangle 8">
@@ -6544,6 +6474,76 @@
           </a:p>
         </p:txBody>
       </p:sp>
+      <p:pic>
+        <p:nvPicPr>
+          <p:cNvPr id="11" name="Picture 2" descr="T:\BBE\Virtual Functional Anatomy\Poster&amp; talks\ISB 2013\Hum Shape\NIH_CC_External_Master_Logo_2Color.jpg">
+            <a:extLst>
+              <a:ext uri="{FF2B5EF4-FFF2-40B4-BE49-F238E27FC236}">
+                <a16:creationId xmlns:a16="http://schemas.microsoft.com/office/drawing/2014/main" id="{C55C9BFC-F02F-9443-859C-EAEC267F9881}"/>
+              </a:ext>
+            </a:extLst>
+          </p:cNvPr>
+          <p:cNvPicPr>
+            <a:picLocks noChangeAspect="1" noChangeArrowheads="1"/>
+          </p:cNvPicPr>
+          <p:nvPr/>
+        </p:nvPicPr>
+        <p:blipFill>
+          <a:blip r:embed="rId2">
+            <a:clrChange>
+              <a:clrFrom>
+                <a:srgbClr val="FFFFFF"/>
+              </a:clrFrom>
+              <a:clrTo>
+                <a:srgbClr val="FFFFFF">
+                  <a:alpha val="0"/>
+                </a:srgbClr>
+              </a:clrTo>
+            </a:clrChange>
+            <a:extLst>
+              <a:ext uri="{28A0092B-C50C-407E-A947-70E740481C1C}">
+                <a14:useLocalDpi xmlns:a14="http://schemas.microsoft.com/office/drawing/2010/main" val="0"/>
+              </a:ext>
+            </a:extLst>
+          </a:blip>
+          <a:srcRect/>
+          <a:stretch>
+            <a:fillRect/>
+          </a:stretch>
+        </p:blipFill>
+        <p:spPr bwMode="auto">
+          <a:xfrm>
+            <a:off x="9693846" y="72973"/>
+            <a:ext cx="2345754" cy="449367"/>
+          </a:xfrm>
+          <a:prstGeom prst="rect">
+            <a:avLst/>
+          </a:prstGeom>
+          <a:noFill/>
+          <a:ln>
+            <a:noFill/>
+          </a:ln>
+          <a:extLst>
+            <a:ext uri="{909E8E84-426E-40DD-AFC4-6F175D3DCCD1}">
+              <a14:hiddenFill xmlns:a14="http://schemas.microsoft.com/office/drawing/2010/main">
+                <a:solidFill>
+                  <a:srgbClr val="FFFFFF"/>
+                </a:solidFill>
+              </a14:hiddenFill>
+            </a:ext>
+            <a:ext uri="{91240B29-F687-4F45-9708-019B960494DF}">
+              <a14:hiddenLine xmlns:a14="http://schemas.microsoft.com/office/drawing/2010/main" w="9525">
+                <a:solidFill>
+                  <a:srgbClr val="000000"/>
+                </a:solidFill>
+                <a:miter lim="800000"/>
+                <a:headEnd/>
+                <a:tailEnd/>
+              </a14:hiddenLine>
+            </a:ext>
+          </a:extLst>
+        </p:spPr>
+      </p:pic>
     </p:spTree>
     <p:extLst>
       <p:ext uri="{BB962C8B-B14F-4D97-AF65-F5344CB8AC3E}">
@@ -21825,6 +21825,76 @@
           </a:graphicData>
         </a:graphic>
       </p:graphicFrame>
+      <p:pic>
+        <p:nvPicPr>
+          <p:cNvPr id="5" name="Picture 2" descr="T:\BBE\Virtual Functional Anatomy\Poster&amp; talks\ISB 2013\Hum Shape\NIH_CC_External_Master_Logo_2Color.jpg">
+            <a:extLst>
+              <a:ext uri="{FF2B5EF4-FFF2-40B4-BE49-F238E27FC236}">
+                <a16:creationId xmlns:a16="http://schemas.microsoft.com/office/drawing/2014/main" id="{3E27E783-AFAF-EE40-BA4C-BCC9235CE08A}"/>
+              </a:ext>
+            </a:extLst>
+          </p:cNvPr>
+          <p:cNvPicPr>
+            <a:picLocks noChangeAspect="1" noChangeArrowheads="1"/>
+          </p:cNvPicPr>
+          <p:nvPr/>
+        </p:nvPicPr>
+        <p:blipFill>
+          <a:blip r:embed="rId2">
+            <a:clrChange>
+              <a:clrFrom>
+                <a:srgbClr val="FFFFFF"/>
+              </a:clrFrom>
+              <a:clrTo>
+                <a:srgbClr val="FFFFFF">
+                  <a:alpha val="0"/>
+                </a:srgbClr>
+              </a:clrTo>
+            </a:clrChange>
+            <a:extLst>
+              <a:ext uri="{28A0092B-C50C-407E-A947-70E740481C1C}">
+                <a14:useLocalDpi xmlns:a14="http://schemas.microsoft.com/office/drawing/2010/main" val="0"/>
+              </a:ext>
+            </a:extLst>
+          </a:blip>
+          <a:srcRect/>
+          <a:stretch>
+            <a:fillRect/>
+          </a:stretch>
+        </p:blipFill>
+        <p:spPr bwMode="auto">
+          <a:xfrm>
+            <a:off x="9693846" y="72973"/>
+            <a:ext cx="2345754" cy="449367"/>
+          </a:xfrm>
+          <a:prstGeom prst="rect">
+            <a:avLst/>
+          </a:prstGeom>
+          <a:noFill/>
+          <a:ln>
+            <a:noFill/>
+          </a:ln>
+          <a:extLst>
+            <a:ext uri="{909E8E84-426E-40DD-AFC4-6F175D3DCCD1}">
+              <a14:hiddenFill xmlns:a14="http://schemas.microsoft.com/office/drawing/2010/main">
+                <a:solidFill>
+                  <a:srgbClr val="FFFFFF"/>
+                </a:solidFill>
+              </a14:hiddenFill>
+            </a:ext>
+            <a:ext uri="{91240B29-F687-4F45-9708-019B960494DF}">
+              <a14:hiddenLine xmlns:a14="http://schemas.microsoft.com/office/drawing/2010/main" w="9525">
+                <a:solidFill>
+                  <a:srgbClr val="000000"/>
+                </a:solidFill>
+                <a:miter lim="800000"/>
+                <a:headEnd/>
+                <a:tailEnd/>
+              </a14:hiddenLine>
+            </a:ext>
+          </a:extLst>
+        </p:spPr>
+      </p:pic>
     </p:spTree>
     <p:extLst>
       <p:ext uri="{BB962C8B-B14F-4D97-AF65-F5344CB8AC3E}">
@@ -23836,6 +23906,76 @@
           </a:p>
         </p:txBody>
       </p:sp>
+      <p:pic>
+        <p:nvPicPr>
+          <p:cNvPr id="17" name="Picture 2" descr="T:\BBE\Virtual Functional Anatomy\Poster&amp; talks\ISB 2013\Hum Shape\NIH_CC_External_Master_Logo_2Color.jpg">
+            <a:extLst>
+              <a:ext uri="{FF2B5EF4-FFF2-40B4-BE49-F238E27FC236}">
+                <a16:creationId xmlns:a16="http://schemas.microsoft.com/office/drawing/2014/main" id="{F54194D4-CDA6-F846-95ED-CA03BB8AB666}"/>
+              </a:ext>
+            </a:extLst>
+          </p:cNvPr>
+          <p:cNvPicPr>
+            <a:picLocks noChangeAspect="1" noChangeArrowheads="1"/>
+          </p:cNvPicPr>
+          <p:nvPr/>
+        </p:nvPicPr>
+        <p:blipFill>
+          <a:blip r:embed="rId5">
+            <a:clrChange>
+              <a:clrFrom>
+                <a:srgbClr val="FFFFFF"/>
+              </a:clrFrom>
+              <a:clrTo>
+                <a:srgbClr val="FFFFFF">
+                  <a:alpha val="0"/>
+                </a:srgbClr>
+              </a:clrTo>
+            </a:clrChange>
+            <a:extLst>
+              <a:ext uri="{28A0092B-C50C-407E-A947-70E740481C1C}">
+                <a14:useLocalDpi xmlns:a14="http://schemas.microsoft.com/office/drawing/2010/main" val="0"/>
+              </a:ext>
+            </a:extLst>
+          </a:blip>
+          <a:srcRect/>
+          <a:stretch>
+            <a:fillRect/>
+          </a:stretch>
+        </p:blipFill>
+        <p:spPr bwMode="auto">
+          <a:xfrm>
+            <a:off x="9693846" y="72973"/>
+            <a:ext cx="2345754" cy="449367"/>
+          </a:xfrm>
+          <a:prstGeom prst="rect">
+            <a:avLst/>
+          </a:prstGeom>
+          <a:noFill/>
+          <a:ln>
+            <a:noFill/>
+          </a:ln>
+          <a:extLst>
+            <a:ext uri="{909E8E84-426E-40DD-AFC4-6F175D3DCCD1}">
+              <a14:hiddenFill xmlns:a14="http://schemas.microsoft.com/office/drawing/2010/main">
+                <a:solidFill>
+                  <a:srgbClr val="FFFFFF"/>
+                </a:solidFill>
+              </a14:hiddenFill>
+            </a:ext>
+            <a:ext uri="{91240B29-F687-4F45-9708-019B960494DF}">
+              <a14:hiddenLine xmlns:a14="http://schemas.microsoft.com/office/drawing/2010/main" w="9525">
+                <a:solidFill>
+                  <a:srgbClr val="000000"/>
+                </a:solidFill>
+                <a:miter lim="800000"/>
+                <a:headEnd/>
+                <a:tailEnd/>
+              </a14:hiddenLine>
+            </a:ext>
+          </a:extLst>
+        </p:spPr>
+      </p:pic>
     </p:spTree>
     <p:extLst>
       <p:ext uri="{BB962C8B-B14F-4D97-AF65-F5344CB8AC3E}">
@@ -24350,6 +24490,76 @@
           </a:p>
         </p:txBody>
       </p:sp>
+      <p:pic>
+        <p:nvPicPr>
+          <p:cNvPr id="18" name="Picture 2" descr="T:\BBE\Virtual Functional Anatomy\Poster&amp; talks\ISB 2013\Hum Shape\NIH_CC_External_Master_Logo_2Color.jpg">
+            <a:extLst>
+              <a:ext uri="{FF2B5EF4-FFF2-40B4-BE49-F238E27FC236}">
+                <a16:creationId xmlns:a16="http://schemas.microsoft.com/office/drawing/2014/main" id="{4154BA27-07B4-A147-B991-4017F6E51A41}"/>
+              </a:ext>
+            </a:extLst>
+          </p:cNvPr>
+          <p:cNvPicPr>
+            <a:picLocks noChangeAspect="1" noChangeArrowheads="1"/>
+          </p:cNvPicPr>
+          <p:nvPr/>
+        </p:nvPicPr>
+        <p:blipFill>
+          <a:blip r:embed="rId5">
+            <a:clrChange>
+              <a:clrFrom>
+                <a:srgbClr val="FFFFFF"/>
+              </a:clrFrom>
+              <a:clrTo>
+                <a:srgbClr val="FFFFFF">
+                  <a:alpha val="0"/>
+                </a:srgbClr>
+              </a:clrTo>
+            </a:clrChange>
+            <a:extLst>
+              <a:ext uri="{28A0092B-C50C-407E-A947-70E740481C1C}">
+                <a14:useLocalDpi xmlns:a14="http://schemas.microsoft.com/office/drawing/2010/main" val="0"/>
+              </a:ext>
+            </a:extLst>
+          </a:blip>
+          <a:srcRect/>
+          <a:stretch>
+            <a:fillRect/>
+          </a:stretch>
+        </p:blipFill>
+        <p:spPr bwMode="auto">
+          <a:xfrm>
+            <a:off x="9693846" y="72973"/>
+            <a:ext cx="2345754" cy="449367"/>
+          </a:xfrm>
+          <a:prstGeom prst="rect">
+            <a:avLst/>
+          </a:prstGeom>
+          <a:noFill/>
+          <a:ln>
+            <a:noFill/>
+          </a:ln>
+          <a:extLst>
+            <a:ext uri="{909E8E84-426E-40DD-AFC4-6F175D3DCCD1}">
+              <a14:hiddenFill xmlns:a14="http://schemas.microsoft.com/office/drawing/2010/main">
+                <a:solidFill>
+                  <a:srgbClr val="FFFFFF"/>
+                </a:solidFill>
+              </a14:hiddenFill>
+            </a:ext>
+            <a:ext uri="{91240B29-F687-4F45-9708-019B960494DF}">
+              <a14:hiddenLine xmlns:a14="http://schemas.microsoft.com/office/drawing/2010/main" w="9525">
+                <a:solidFill>
+                  <a:srgbClr val="000000"/>
+                </a:solidFill>
+                <a:miter lim="800000"/>
+                <a:headEnd/>
+                <a:tailEnd/>
+              </a14:hiddenLine>
+            </a:ext>
+          </a:extLst>
+        </p:spPr>
+      </p:pic>
     </p:spTree>
     <p:extLst>
       <p:ext uri="{BB962C8B-B14F-4D97-AF65-F5344CB8AC3E}">
@@ -24750,6 +24960,76 @@
           </a:p>
         </p:txBody>
       </p:sp>
+      <p:pic>
+        <p:nvPicPr>
+          <p:cNvPr id="14" name="Picture 2" descr="T:\BBE\Virtual Functional Anatomy\Poster&amp; talks\ISB 2013\Hum Shape\NIH_CC_External_Master_Logo_2Color.jpg">
+            <a:extLst>
+              <a:ext uri="{FF2B5EF4-FFF2-40B4-BE49-F238E27FC236}">
+                <a16:creationId xmlns:a16="http://schemas.microsoft.com/office/drawing/2014/main" id="{93EEB6AE-725E-C548-9943-F97FB52B92DC}"/>
+              </a:ext>
+            </a:extLst>
+          </p:cNvPr>
+          <p:cNvPicPr>
+            <a:picLocks noChangeAspect="1" noChangeArrowheads="1"/>
+          </p:cNvPicPr>
+          <p:nvPr/>
+        </p:nvPicPr>
+        <p:blipFill>
+          <a:blip r:embed="rId5">
+            <a:clrChange>
+              <a:clrFrom>
+                <a:srgbClr val="FFFFFF"/>
+              </a:clrFrom>
+              <a:clrTo>
+                <a:srgbClr val="FFFFFF">
+                  <a:alpha val="0"/>
+                </a:srgbClr>
+              </a:clrTo>
+            </a:clrChange>
+            <a:extLst>
+              <a:ext uri="{28A0092B-C50C-407E-A947-70E740481C1C}">
+                <a14:useLocalDpi xmlns:a14="http://schemas.microsoft.com/office/drawing/2010/main" val="0"/>
+              </a:ext>
+            </a:extLst>
+          </a:blip>
+          <a:srcRect/>
+          <a:stretch>
+            <a:fillRect/>
+          </a:stretch>
+        </p:blipFill>
+        <p:spPr bwMode="auto">
+          <a:xfrm>
+            <a:off x="9693846" y="72973"/>
+            <a:ext cx="2345754" cy="449367"/>
+          </a:xfrm>
+          <a:prstGeom prst="rect">
+            <a:avLst/>
+          </a:prstGeom>
+          <a:noFill/>
+          <a:ln>
+            <a:noFill/>
+          </a:ln>
+          <a:extLst>
+            <a:ext uri="{909E8E84-426E-40DD-AFC4-6F175D3DCCD1}">
+              <a14:hiddenFill xmlns:a14="http://schemas.microsoft.com/office/drawing/2010/main">
+                <a:solidFill>
+                  <a:srgbClr val="FFFFFF"/>
+                </a:solidFill>
+              </a14:hiddenFill>
+            </a:ext>
+            <a:ext uri="{91240B29-F687-4F45-9708-019B960494DF}">
+              <a14:hiddenLine xmlns:a14="http://schemas.microsoft.com/office/drawing/2010/main" w="9525">
+                <a:solidFill>
+                  <a:srgbClr val="000000"/>
+                </a:solidFill>
+                <a:miter lim="800000"/>
+                <a:headEnd/>
+                <a:tailEnd/>
+              </a14:hiddenLine>
+            </a:ext>
+          </a:extLst>
+        </p:spPr>
+      </p:pic>
     </p:spTree>
     <p:extLst>
       <p:ext uri="{BB962C8B-B14F-4D97-AF65-F5344CB8AC3E}">
@@ -26499,10 +26779,10 @@
       </p:sp>
       <p:pic>
         <p:nvPicPr>
-          <p:cNvPr id="7" name="Picture 2" descr="T:\BBE\Virtual Functional Anatomy\Poster&amp; talks\ISB 2013\Hum Shape\NIH_CC_External_Master_Logo_2Color.jpg">
+          <p:cNvPr id="8" name="Picture 2" descr="T:\BBE\Virtual Functional Anatomy\Poster&amp; talks\ISB 2013\Hum Shape\NIH_CC_External_Master_Logo_2Color.jpg">
             <a:extLst>
               <a:ext uri="{FF2B5EF4-FFF2-40B4-BE49-F238E27FC236}">
-                <a16:creationId xmlns:a16="http://schemas.microsoft.com/office/drawing/2014/main" id="{EE465676-8CF9-694F-9119-1C88D157CD7B}"/>
+                <a16:creationId xmlns:a16="http://schemas.microsoft.com/office/drawing/2014/main" id="{00961D6F-C438-4747-B1CF-D7FD32A28EA4}"/>
               </a:ext>
             </a:extLst>
           </p:cNvPr>
@@ -26536,7 +26816,7 @@
         </p:blipFill>
         <p:spPr bwMode="auto">
           <a:xfrm>
-            <a:off x="9693846" y="238073"/>
+            <a:off x="9693846" y="72973"/>
             <a:ext cx="2345754" cy="449367"/>
           </a:xfrm>
           <a:prstGeom prst="rect">
@@ -27156,10 +27436,10 @@
       </p:sp>
       <p:pic>
         <p:nvPicPr>
-          <p:cNvPr id="12" name="Picture 2" descr="T:\BBE\Virtual Functional Anatomy\Poster&amp; talks\ISB 2013\Hum Shape\NIH_CC_External_Master_Logo_2Color.jpg">
+          <p:cNvPr id="13" name="Picture 2" descr="T:\BBE\Virtual Functional Anatomy\Poster&amp; talks\ISB 2013\Hum Shape\NIH_CC_External_Master_Logo_2Color.jpg">
             <a:extLst>
               <a:ext uri="{FF2B5EF4-FFF2-40B4-BE49-F238E27FC236}">
-                <a16:creationId xmlns:a16="http://schemas.microsoft.com/office/drawing/2014/main" id="{F0377C1F-8971-E245-B010-55F92C72EAE6}"/>
+                <a16:creationId xmlns:a16="http://schemas.microsoft.com/office/drawing/2014/main" id="{AB114DDA-F24E-DF47-AAB3-8675E56CA1A7}"/>
               </a:ext>
             </a:extLst>
           </p:cNvPr>
@@ -27193,7 +27473,7 @@
         </p:blipFill>
         <p:spPr bwMode="auto">
           <a:xfrm>
-            <a:off x="9693846" y="238073"/>
+            <a:off x="9693846" y="72973"/>
             <a:ext cx="2345754" cy="449367"/>
           </a:xfrm>
           <a:prstGeom prst="rect">
@@ -31902,21 +32182,6 @@
 </file>
 
 <file path=customXml/item1.xml><?xml version="1.0" encoding="utf-8"?>
-<p:properties xmlns:p="http://schemas.microsoft.com/office/2006/metadata/properties" xmlns:xsi="http://www.w3.org/2001/XMLSchema-instance" xmlns:pc="http://schemas.microsoft.com/office/infopath/2007/PartnerControls">
-  <documentManagement/>
-</p:properties>
-</file>
-
-<file path=customXml/item2.xml><?xml version="1.0" encoding="utf-8"?>
-<?mso-contentType ?>
-<FormTemplates xmlns="http://schemas.microsoft.com/sharepoint/v3/contenttype/forms">
-  <Display>DocumentLibraryForm</Display>
-  <Edit>DocumentLibraryForm</Edit>
-  <New>DocumentLibraryForm</New>
-</FormTemplates>
-</file>
-
-<file path=customXml/item3.xml><?xml version="1.0" encoding="utf-8"?>
 <ct:contentTypeSchema xmlns:ct="http://schemas.microsoft.com/office/2006/metadata/contentType" xmlns:ma="http://schemas.microsoft.com/office/2006/metadata/properties/metaAttributes" ct:_="" ma:_="" ma:contentTypeName="Document" ma:contentTypeID="0x0101000D18B311E8EE614DB5361ED81C7F6730" ma:contentTypeVersion="1" ma:contentTypeDescription="Create a new document." ma:contentTypeScope="" ma:versionID="e00f4897878562054b5deb9711ff4b76">
   <xsd:schema xmlns:xsd="http://www.w3.org/2001/XMLSchema" xmlns:xs="http://www.w3.org/2001/XMLSchema" xmlns:p="http://schemas.microsoft.com/office/2006/metadata/properties" xmlns:ns2="13035a31-50c9-4126-a303-489fe38739f6" targetNamespace="http://schemas.microsoft.com/office/2006/metadata/properties" ma:root="true" ma:fieldsID="f7615c589225d2c3334d546f7e91cfd2" ns2:_="">
     <xsd:import namespace="13035a31-50c9-4126-a303-489fe38739f6"/>
@@ -32056,24 +32321,22 @@
 </ct:contentTypeSchema>
 </file>
 
-<file path=customXml/itemProps1.xml><?xml version="1.0" encoding="utf-8"?>
-<ds:datastoreItem xmlns:ds="http://schemas.openxmlformats.org/officeDocument/2006/customXml" ds:itemID="{863A6B24-A8A6-48FC-AC57-98B1032E8F3F}">
-  <ds:schemaRefs>
-    <ds:schemaRef ds:uri="http://schemas.microsoft.com/office/2006/metadata/properties"/>
-    <ds:schemaRef ds:uri="http://schemas.microsoft.com/office/infopath/2007/PartnerControls"/>
-  </ds:schemaRefs>
-</ds:datastoreItem>
+<file path=customXml/item2.xml><?xml version="1.0" encoding="utf-8"?>
+<?mso-contentType ?>
+<FormTemplates xmlns="http://schemas.microsoft.com/sharepoint/v3/contenttype/forms">
+  <Display>DocumentLibraryForm</Display>
+  <Edit>DocumentLibraryForm</Edit>
+  <New>DocumentLibraryForm</New>
+</FormTemplates>
 </file>
 
-<file path=customXml/itemProps2.xml><?xml version="1.0" encoding="utf-8"?>
-<ds:datastoreItem xmlns:ds="http://schemas.openxmlformats.org/officeDocument/2006/customXml" ds:itemID="{78E9C5C8-26F9-4443-ADCB-D9A5E96DECEC}">
-  <ds:schemaRefs>
-    <ds:schemaRef ds:uri="http://schemas.microsoft.com/sharepoint/v3/contenttype/forms"/>
-  </ds:schemaRefs>
-</ds:datastoreItem>
+<file path=customXml/item3.xml><?xml version="1.0" encoding="utf-8"?>
+<p:properties xmlns:p="http://schemas.microsoft.com/office/2006/metadata/properties" xmlns:xsi="http://www.w3.org/2001/XMLSchema-instance" xmlns:pc="http://schemas.microsoft.com/office/infopath/2007/PartnerControls">
+  <documentManagement/>
+</p:properties>
 </file>
 
-<file path=customXml/itemProps3.xml><?xml version="1.0" encoding="utf-8"?>
+<file path=customXml/itemProps1.xml><?xml version="1.0" encoding="utf-8"?>
 <ds:datastoreItem xmlns:ds="http://schemas.openxmlformats.org/officeDocument/2006/customXml" ds:itemID="{C3D55472-D8DA-40AD-9973-DC57D3B24F91}">
   <ds:schemaRefs>
     <ds:schemaRef ds:uri="http://schemas.microsoft.com/office/2006/metadata/contentType"/>
@@ -32089,4 +32352,21 @@
     <ds:schemaRef ds:uri="http://schemas.microsoft.com/internal/obd"/>
   </ds:schemaRefs>
 </ds:datastoreItem>
+</file>
+
+<file path=customXml/itemProps2.xml><?xml version="1.0" encoding="utf-8"?>
+<ds:datastoreItem xmlns:ds="http://schemas.openxmlformats.org/officeDocument/2006/customXml" ds:itemID="{78E9C5C8-26F9-4443-ADCB-D9A5E96DECEC}">
+  <ds:schemaRefs>
+    <ds:schemaRef ds:uri="http://schemas.microsoft.com/sharepoint/v3/contenttype/forms"/>
+  </ds:schemaRefs>
+</ds:datastoreItem>
+</file>
+
+<file path=customXml/itemProps3.xml><?xml version="1.0" encoding="utf-8"?>
+<ds:datastoreItem xmlns:ds="http://schemas.openxmlformats.org/officeDocument/2006/customXml" ds:itemID="{863A6B24-A8A6-48FC-AC57-98B1032E8F3F}">
+  <ds:schemaRefs>
+    <ds:schemaRef ds:uri="http://schemas.microsoft.com/office/2006/metadata/properties"/>
+    <ds:schemaRef ds:uri="http://schemas.microsoft.com/office/infopath/2007/PartnerControls"/>
+  </ds:schemaRefs>
+</ds:datastoreItem>
 </file>
</xml_diff>